<commit_message>
Update IoT-Solution-Architecture (Ver. 1.0).pptx
</commit_message>
<xml_diff>
--- a/IoT-Solution-Architecture (Ver. 1.0).pptx
+++ b/IoT-Solution-Architecture (Ver. 1.0).pptx
@@ -5,15 +5,16 @@
     <p:sldMasterId id="2147483673" r:id="rId1"/>
   </p:sldMasterIdLst>
   <p:notesMasterIdLst>
-    <p:notesMasterId r:id="rId8"/>
+    <p:notesMasterId r:id="rId9"/>
   </p:notesMasterIdLst>
   <p:sldIdLst>
     <p:sldId id="256" r:id="rId2"/>
     <p:sldId id="259" r:id="rId3"/>
     <p:sldId id="257" r:id="rId4"/>
-    <p:sldId id="261" r:id="rId5"/>
-    <p:sldId id="260" r:id="rId6"/>
-    <p:sldId id="258" r:id="rId7"/>
+    <p:sldId id="262" r:id="rId5"/>
+    <p:sldId id="261" r:id="rId6"/>
+    <p:sldId id="260" r:id="rId7"/>
+    <p:sldId id="258" r:id="rId8"/>
   </p:sldIdLst>
   <p:sldSz cx="12192000" cy="6858000"/>
   <p:notesSz cx="6858000" cy="9144000"/>
@@ -202,7 +203,7 @@
           <a:p>
             <a:fld id="{FAC91539-8575-2542-9919-BE9F0C1E5EBD}" type="datetimeFigureOut">
               <a:rPr lang="en-US" smtClean="0"/>
-              <a:t>7/8/19</a:t>
+              <a:t>7/10/19</a:t>
             </a:fld>
             <a:endParaRPr lang="en-US"/>
           </a:p>
@@ -707,7 +708,7 @@
           <a:p>
             <a:fld id="{ED291B17-9318-49DB-B28B-6E5994AE9581}" type="datetime1">
               <a:rPr lang="en-US" smtClean="0"/>
-              <a:t>7/8/19</a:t>
+              <a:t>7/10/19</a:t>
             </a:fld>
             <a:endParaRPr lang="en-US" dirty="0"/>
           </a:p>
@@ -910,7 +911,7 @@
           <a:p>
             <a:fld id="{2CED4963-E985-44C4-B8C4-FDD613B7C2F8}" type="datetime1">
               <a:rPr lang="en-US" smtClean="0"/>
-              <a:t>7/8/19</a:t>
+              <a:t>7/10/19</a:t>
             </a:fld>
             <a:endParaRPr lang="en-US" dirty="0"/>
           </a:p>
@@ -1272,7 +1273,7 @@
           <a:p>
             <a:fld id="{ED291B17-9318-49DB-B28B-6E5994AE9581}" type="datetime1">
               <a:rPr lang="en-US" smtClean="0"/>
-              <a:t>7/8/19</a:t>
+              <a:t>7/10/19</a:t>
             </a:fld>
             <a:endParaRPr lang="en-US" dirty="0"/>
           </a:p>
@@ -1470,7 +1471,7 @@
           <a:p>
             <a:fld id="{78DD82B9-B8EE-4375-B6FF-88FA6ABB15D9}" type="datetime1">
               <a:rPr lang="en-US" smtClean="0"/>
-              <a:t>7/8/19</a:t>
+              <a:t>7/10/19</a:t>
             </a:fld>
             <a:endParaRPr lang="en-US" dirty="0"/>
           </a:p>
@@ -1782,7 +1783,7 @@
           <a:p>
             <a:fld id="{B2497495-0637-405E-AE64-5CC7506D51F5}" type="datetime1">
               <a:rPr lang="en-US" smtClean="0"/>
-              <a:t>7/8/19</a:t>
+              <a:t>7/10/19</a:t>
             </a:fld>
             <a:endParaRPr lang="en-US" dirty="0"/>
           </a:p>
@@ -2035,7 +2036,7 @@
           <a:p>
             <a:fld id="{7BFFD690-9426-415D-8B65-26881E07B2D4}" type="datetime1">
               <a:rPr lang="en-US" smtClean="0"/>
-              <a:t>7/8/19</a:t>
+              <a:t>7/10/19</a:t>
             </a:fld>
             <a:endParaRPr lang="en-US" dirty="0"/>
           </a:p>
@@ -2457,7 +2458,7 @@
           <a:p>
             <a:fld id="{04C4989A-474C-40DE-95B9-011C28B71673}" type="datetime1">
               <a:rPr lang="en-US" smtClean="0"/>
-              <a:t>7/8/19</a:t>
+              <a:t>7/10/19</a:t>
             </a:fld>
             <a:endParaRPr lang="en-US" dirty="0"/>
           </a:p>
@@ -2580,7 +2581,7 @@
           <a:p>
             <a:fld id="{5DB4ED54-5B5E-4A04-93D3-5772E3CE3818}" type="datetime1">
               <a:rPr lang="en-US" smtClean="0"/>
-              <a:t>7/8/19</a:t>
+              <a:t>7/10/19</a:t>
             </a:fld>
             <a:endParaRPr lang="en-US" dirty="0"/>
           </a:p>
@@ -2675,7 +2676,7 @@
           <a:p>
             <a:fld id="{4EDE50D6-574B-40AF-946F-D52A04ADE379}" type="datetime1">
               <a:rPr lang="en-US" smtClean="0"/>
-              <a:t>7/8/19</a:t>
+              <a:t>7/10/19</a:t>
             </a:fld>
             <a:endParaRPr lang="en-US" dirty="0"/>
           </a:p>
@@ -3052,7 +3053,7 @@
           <a:p>
             <a:fld id="{D82884F1-FFEA-405F-9602-3DCA865EDA4E}" type="datetime1">
               <a:rPr lang="en-US" smtClean="0"/>
-              <a:t>7/8/19</a:t>
+              <a:t>7/10/19</a:t>
             </a:fld>
             <a:endParaRPr lang="en-US" dirty="0"/>
           </a:p>
@@ -3345,7 +3346,7 @@
           <a:p>
             <a:fld id="{7E18DB4A-8810-4A10-AD5C-D5E2C667F5B3}" type="datetime1">
               <a:rPr lang="en-US" smtClean="0"/>
-              <a:t>7/8/19</a:t>
+              <a:t>7/10/19</a:t>
             </a:fld>
             <a:endParaRPr lang="en-US" dirty="0"/>
           </a:p>
@@ -3565,7 +3566,7 @@
           <a:p>
             <a:fld id="{ED291B17-9318-49DB-B28B-6E5994AE9581}" type="datetime1">
               <a:rPr lang="en-US" smtClean="0"/>
-              <a:t>7/8/19</a:t>
+              <a:t>7/10/19</a:t>
             </a:fld>
             <a:endParaRPr lang="en-US" dirty="0"/>
           </a:p>
@@ -5007,6 +5008,108 @@
     <p:bg>
       <p:bgPr>
         <a:solidFill>
+          <a:schemeClr val="bg1"/>
+        </a:solidFill>
+        <a:effectLst/>
+      </p:bgPr>
+    </p:bg>
+    <p:spTree>
+      <p:nvGrpSpPr>
+        <p:cNvPr id="1" name=""/>
+        <p:cNvGrpSpPr/>
+        <p:nvPr/>
+      </p:nvGrpSpPr>
+      <p:grpSpPr>
+        <a:xfrm>
+          <a:off x="0" y="0"/>
+          <a:ext cx="0" cy="0"/>
+          <a:chOff x="0" y="0"/>
+          <a:chExt cx="0" cy="0"/>
+        </a:xfrm>
+      </p:grpSpPr>
+      <p:sp>
+        <p:nvSpPr>
+          <p:cNvPr id="2" name="Title 1">
+            <a:extLst>
+              <a:ext uri="{FF2B5EF4-FFF2-40B4-BE49-F238E27FC236}">
+                <a16:creationId xmlns:a16="http://schemas.microsoft.com/office/drawing/2014/main" id="{B86039CD-55B2-7A4E-BDAC-06623279017F}"/>
+              </a:ext>
+            </a:extLst>
+          </p:cNvPr>
+          <p:cNvSpPr>
+            <a:spLocks noGrp="1"/>
+          </p:cNvSpPr>
+          <p:nvPr>
+            <p:ph type="title"/>
+          </p:nvPr>
+        </p:nvSpPr>
+        <p:spPr>
+          <a:xfrm>
+            <a:off x="453974" y="0"/>
+            <a:ext cx="11029616" cy="437291"/>
+          </a:xfrm>
+        </p:spPr>
+        <p:txBody>
+          <a:bodyPr>
+            <a:normAutofit fontScale="90000"/>
+          </a:bodyPr>
+          <a:lstStyle/>
+          <a:p>
+            <a:r>
+              <a:rPr lang="en-US" dirty="0"/>
+              <a:t>Data Flow Diagram</a:t>
+            </a:r>
+          </a:p>
+        </p:txBody>
+      </p:sp>
+      <p:pic>
+        <p:nvPicPr>
+          <p:cNvPr id="4" name="Picture 3">
+            <a:extLst>
+              <a:ext uri="{FF2B5EF4-FFF2-40B4-BE49-F238E27FC236}">
+                <a16:creationId xmlns:a16="http://schemas.microsoft.com/office/drawing/2014/main" id="{3B87E20B-C22B-1A40-AF73-BF924FC49A46}"/>
+              </a:ext>
+            </a:extLst>
+          </p:cNvPr>
+          <p:cNvPicPr>
+            <a:picLocks noChangeAspect="1"/>
+          </p:cNvPicPr>
+          <p:nvPr/>
+        </p:nvPicPr>
+        <p:blipFill rotWithShape="1">
+          <a:blip r:embed="rId2"/>
+          <a:srcRect b="12965"/>
+          <a:stretch/>
+        </p:blipFill>
+        <p:spPr>
+          <a:xfrm>
+            <a:off x="453974" y="614597"/>
+            <a:ext cx="11408242" cy="6224599"/>
+          </a:xfrm>
+          <a:prstGeom prst="rect">
+            <a:avLst/>
+          </a:prstGeom>
+        </p:spPr>
+      </p:pic>
+    </p:spTree>
+    <p:extLst>
+      <p:ext uri="{BB962C8B-B14F-4D97-AF65-F5344CB8AC3E}">
+        <p14:creationId xmlns:p14="http://schemas.microsoft.com/office/powerpoint/2010/main" val="1960261631"/>
+      </p:ext>
+    </p:extLst>
+  </p:cSld>
+  <p:clrMapOvr>
+    <a:masterClrMapping/>
+  </p:clrMapOvr>
+</p:sld>
+</file>
+
+<file path=ppt/slides/slide5.xml><?xml version="1.0" encoding="utf-8"?>
+<p:sld xmlns:a="http://schemas.openxmlformats.org/drawingml/2006/main" xmlns:r="http://schemas.openxmlformats.org/officeDocument/2006/relationships" xmlns:p="http://schemas.openxmlformats.org/presentationml/2006/main">
+  <p:cSld>
+    <p:bg>
+      <p:bgPr>
+        <a:solidFill>
           <a:schemeClr val="bg2"/>
         </a:solidFill>
         <a:effectLst/>
@@ -5498,7 +5601,7 @@
 </p:sld>
 </file>
 
-<file path=ppt/slides/slide5.xml><?xml version="1.0" encoding="utf-8"?>
+<file path=ppt/slides/slide6.xml><?xml version="1.0" encoding="utf-8"?>
 <p:sld xmlns:a="http://schemas.openxmlformats.org/drawingml/2006/main" xmlns:r="http://schemas.openxmlformats.org/officeDocument/2006/relationships" xmlns:p="http://schemas.openxmlformats.org/presentationml/2006/main">
   <p:cSld>
     <p:bg>
@@ -6023,7 +6126,7 @@
 </p:sld>
 </file>
 
-<file path=ppt/slides/slide6.xml><?xml version="1.0" encoding="utf-8"?>
+<file path=ppt/slides/slide7.xml><?xml version="1.0" encoding="utf-8"?>
 <p:sld xmlns:a="http://schemas.openxmlformats.org/drawingml/2006/main" xmlns:r="http://schemas.openxmlformats.org/officeDocument/2006/relationships" xmlns:p="http://schemas.openxmlformats.org/presentationml/2006/main">
   <p:cSld>
     <p:spTree>
@@ -16591,6 +16694,74 @@
           </a:prstGeom>
         </p:spPr>
       </p:pic>
+      <p:sp>
+        <p:nvSpPr>
+          <p:cNvPr id="227" name="Shape 226">
+            <a:extLst>
+              <a:ext uri="{FF2B5EF4-FFF2-40B4-BE49-F238E27FC236}">
+                <a16:creationId xmlns:a16="http://schemas.microsoft.com/office/drawing/2014/main" id="{12259C07-A1A1-E742-BD15-CE01D4B2F52B}"/>
+              </a:ext>
+            </a:extLst>
+          </p:cNvPr>
+          <p:cNvSpPr/>
+          <p:nvPr/>
+        </p:nvSpPr>
+        <p:spPr>
+          <a:xfrm>
+            <a:off x="1173077" y="3835718"/>
+            <a:ext cx="618759" cy="123111"/>
+          </a:xfrm>
+          <a:prstGeom prst="rect">
+            <a:avLst/>
+          </a:prstGeom>
+          <a:noFill/>
+          <a:ln w="3175" cap="flat">
+            <a:noFill/>
+            <a:miter lim="400000"/>
+          </a:ln>
+          <a:effectLst/>
+          <a:extLst>
+            <a:ext uri="{C572A759-6A51-4108-AA02-DFA0A04FC94B}">
+              <ma14:wrappingTextBoxFlag xmlns:ma14="http://schemas.microsoft.com/office/mac/drawingml/2011/main" xmlns="" val="1"/>
+            </a:ext>
+          </a:extLst>
+        </p:spPr>
+        <p:txBody>
+          <a:bodyPr wrap="none" lIns="0" tIns="0" rIns="0" bIns="0" numCol="1" anchor="t">
+            <a:spAutoFit/>
+          </a:bodyPr>
+          <a:lstStyle>
+            <a:lvl1pPr>
+              <a:defRPr sz="800" b="1">
+                <a:solidFill>
+                  <a:srgbClr val="4277BB"/>
+                </a:solidFill>
+                <a:latin typeface="Helvetica"/>
+                <a:ea typeface="Helvetica"/>
+                <a:cs typeface="Helvetica"/>
+                <a:sym typeface="Helvetica"/>
+              </a:defRPr>
+            </a:lvl1pPr>
+          </a:lstStyle>
+          <a:p>
+            <a:pPr lvl="0">
+              <a:defRPr sz="1800" b="0">
+                <a:solidFill>
+                  <a:srgbClr val="000000"/>
+                </a:solidFill>
+              </a:defRPr>
+            </a:pPr>
+            <a:r>
+              <a:rPr lang="en-US" sz="800" b="1" dirty="0">
+                <a:solidFill>
+                  <a:srgbClr val="4277BB"/>
+                </a:solidFill>
+              </a:rPr>
+              <a:t>React Native</a:t>
+            </a:r>
+          </a:p>
+        </p:txBody>
+      </p:sp>
     </p:spTree>
     <p:extLst>
       <p:ext uri="{BB962C8B-B14F-4D97-AF65-F5344CB8AC3E}">

</xml_diff>